<commit_message>
Added thank you for listening slide and changed I and T definitions to chisari 2015
</commit_message>
<xml_diff>
--- a/PresentationSlides.pptx
+++ b/PresentationSlides.pptx
@@ -9,6 +9,7 @@
     <p:sldId id="257" r:id="rId3"/>
     <p:sldId id="258" r:id="rId4"/>
     <p:sldId id="259" r:id="rId5"/>
+    <p:sldId id="260" r:id="rId6"/>
   </p:sldIdLst>
   <p:sldSz cx="9144000" cy="6858000" type="screen4x3"/>
   <p:notesSz cx="6858000" cy="9144000"/>
@@ -3194,6 +3195,13 @@
   <p:clrMapOvr>
     <a:masterClrMapping/>
   </p:clrMapOvr>
+  <p:timing>
+    <p:tnLst>
+      <p:par>
+        <p:cTn xmlns:p14="http://schemas.microsoft.com/office/powerpoint/2010/main" id="1" dur="indefinite" restart="never" nodeType="tmRoot"/>
+      </p:par>
+    </p:tnLst>
+  </p:timing>
 </p:sld>
 </file>
 
@@ -3464,6 +3472,13 @@
   <p:clrMapOvr>
     <a:masterClrMapping/>
   </p:clrMapOvr>
+  <p:timing>
+    <p:tnLst>
+      <p:par>
+        <p:cTn xmlns:p14="http://schemas.microsoft.com/office/powerpoint/2010/main" id="1" dur="indefinite" restart="never" nodeType="tmRoot"/>
+      </p:par>
+    </p:tnLst>
+  </p:timing>
 </p:sld>
 </file>
 
@@ -3525,7 +3540,7 @@
         </p:nvSpPr>
         <p:spPr>
           <a:xfrm>
-            <a:off x="4153963" y="128421"/>
+            <a:off x="4296671" y="527950"/>
             <a:ext cx="4793813" cy="3795532"/>
           </a:xfrm>
         </p:spPr>
@@ -3660,6 +3675,13 @@
   <p:clrMapOvr>
     <a:masterClrMapping/>
   </p:clrMapOvr>
+  <p:timing>
+    <p:tnLst>
+      <p:par>
+        <p:cTn xmlns:p14="http://schemas.microsoft.com/office/powerpoint/2010/main" id="1" dur="indefinite" restart="never" nodeType="tmRoot"/>
+      </p:par>
+    </p:tnLst>
+  </p:timing>
 </p:sld>
 </file>
 
@@ -3739,7 +3761,7 @@
           <a:p>
             <a:r>
               <a:rPr lang="en-US" sz="2400" dirty="0" smtClean="0"/>
-              <a:t>Moment of inertia tensor, I </a:t>
+              <a:t>Reduced moment of inertia tensor, I </a:t>
             </a:r>
           </a:p>
           <a:p>
@@ -3763,25 +3785,60 @@
             <a:pPr lvl="1"/>
             <a:r>
               <a:rPr lang="en-US" sz="2400" dirty="0" smtClean="0"/>
-              <a:t>Calculated from the deformation tensor, D</a:t>
-            </a:r>
-          </a:p>
-          <a:p>
-            <a:pPr lvl="1"/>
-            <a:r>
-              <a:rPr lang="en-US" sz="2400" dirty="0"/>
-              <a:t>S</a:t>
-            </a:r>
-            <a:r>
-              <a:rPr lang="en-US" sz="2400" dirty="0" smtClean="0"/>
-              <a:t>moothed kernel calculation from cosmic web</a:t>
-            </a:r>
+              <a:t>Smoothed kernel calculation from cosmic web</a:t>
+            </a:r>
+          </a:p>
+        </p:txBody>
+      </p:sp>
+      <p:sp>
+        <p:nvSpPr>
+          <p:cNvPr id="6" name="TextBox 5"/>
+          <p:cNvSpPr txBox="1"/>
+          <p:nvPr/>
+        </p:nvSpPr>
+        <p:spPr>
+          <a:xfrm>
+            <a:off x="457200" y="5978678"/>
+            <a:ext cx="8229599" cy="369332"/>
+          </a:xfrm>
+          <a:prstGeom prst="rect">
+            <a:avLst/>
+          </a:prstGeom>
+          <a:noFill/>
+        </p:spPr>
+        <p:txBody>
+          <a:bodyPr wrap="square" rtlCol="0">
+            <a:spAutoFit/>
+          </a:bodyPr>
+          <a:lstStyle/>
+          <a:p>
+            <a:r>
+              <a:rPr lang="en-US" dirty="0" smtClean="0"/>
+              <a:t>Definitions of moment of inertia</a:t>
+            </a:r>
+            <a:r>
+              <a:rPr lang="en-US" dirty="0"/>
+              <a:t> </a:t>
+            </a:r>
+            <a:r>
+              <a:rPr lang="en-US" dirty="0" smtClean="0"/>
+              <a:t>tensor I, and tidal shear tensor, T. </a:t>
+            </a:r>
+            <a:r>
+              <a:rPr lang="en-US" dirty="0" err="1" smtClean="0"/>
+              <a:t>Chisari</a:t>
+            </a:r>
+            <a:r>
+              <a:rPr lang="en-US" dirty="0" smtClean="0"/>
+              <a:t> et al 2015</a:t>
+            </a:r>
+            <a:endParaRPr lang="en-US" dirty="0"/>
           </a:p>
         </p:txBody>
       </p:sp>
       <p:pic>
         <p:nvPicPr>
-          <p:cNvPr id="4" name="Picture 3" descr="inertia tensor porciani.png"/>
+          <p:cNvPr id="8" name="Picture 7" descr="reduced inertia tensor of galaxy chisari 2015.png"/>
           <p:cNvPicPr>
             <a:picLocks noChangeAspect="1"/>
           </p:cNvPicPr>
@@ -3801,8 +3858,8 @@
         </p:blipFill>
         <p:spPr>
           <a:xfrm>
-            <a:off x="970950" y="3610038"/>
-            <a:ext cx="3476884" cy="1493076"/>
+            <a:off x="4423941" y="3246146"/>
+            <a:ext cx="3835400" cy="2501900"/>
           </a:xfrm>
           <a:prstGeom prst="rect">
             <a:avLst/>
@@ -3811,7 +3868,7 @@
       </p:pic>
       <p:pic>
         <p:nvPicPr>
-          <p:cNvPr id="5" name="Picture 4" descr="deformation tensor porciani.png"/>
+          <p:cNvPr id="9" name="Picture 8" descr="3D traceless tidal shear tensor chisari 2015.png"/>
           <p:cNvPicPr>
             <a:picLocks noChangeAspect="1"/>
           </p:cNvPicPr>
@@ -3831,47 +3888,75 @@
         </p:blipFill>
         <p:spPr>
           <a:xfrm>
-            <a:off x="5115981" y="3610038"/>
-            <a:ext cx="3570819" cy="1627070"/>
+            <a:off x="457200" y="3963850"/>
+            <a:ext cx="3966741" cy="1098820"/>
           </a:xfrm>
           <a:prstGeom prst="rect">
             <a:avLst/>
           </a:prstGeom>
         </p:spPr>
       </p:pic>
-      <p:sp>
-        <p:nvSpPr>
-          <p:cNvPr id="6" name="TextBox 5"/>
-          <p:cNvSpPr txBox="1"/>
-          <p:nvPr/>
+    </p:spTree>
+    <p:extLst>
+      <p:ext uri="{BB962C8B-B14F-4D97-AF65-F5344CB8AC3E}">
+        <p14:creationId xmlns:p14="http://schemas.microsoft.com/office/powerpoint/2010/main" val="1356698628"/>
+      </p:ext>
+    </p:extLst>
+  </p:cSld>
+  <p:clrMapOvr>
+    <a:masterClrMapping/>
+  </p:clrMapOvr>
+  <p:timing>
+    <p:tnLst>
+      <p:par>
+        <p:cTn xmlns:p14="http://schemas.microsoft.com/office/powerpoint/2010/main" id="1" dur="indefinite" restart="never" nodeType="tmRoot"/>
+      </p:par>
+    </p:tnLst>
+  </p:timing>
+</p:sld>
+</file>
+
+<file path=ppt/slides/slide5.xml><?xml version="1.0" encoding="utf-8"?>
+<p:sld xmlns:a="http://schemas.openxmlformats.org/drawingml/2006/main" xmlns:r="http://schemas.openxmlformats.org/officeDocument/2006/relationships" xmlns:p="http://schemas.openxmlformats.org/presentationml/2006/main">
+  <p:cSld>
+    <p:spTree>
+      <p:nvGrpSpPr>
+        <p:cNvPr id="1" name=""/>
+        <p:cNvGrpSpPr/>
+        <p:nvPr/>
+      </p:nvGrpSpPr>
+      <p:grpSpPr>
+        <a:xfrm>
+          <a:off x="0" y="0"/>
+          <a:ext cx="0" cy="0"/>
+          <a:chOff x="0" y="0"/>
+          <a:chExt cx="0" cy="0"/>
+        </a:xfrm>
+      </p:grpSpPr>
+      <p:sp>
+        <p:nvSpPr>
+          <p:cNvPr id="2" name="Title 1"/>
+          <p:cNvSpPr>
+            <a:spLocks noGrp="1"/>
+          </p:cNvSpPr>
+          <p:nvPr>
+            <p:ph type="title"/>
+          </p:nvPr>
         </p:nvSpPr>
         <p:spPr>
           <a:xfrm>
-            <a:off x="813433" y="5978678"/>
-            <a:ext cx="7477887" cy="646331"/>
+            <a:off x="0" y="-181968"/>
+            <a:ext cx="8229600" cy="1143000"/>
           </a:xfrm>
-          <a:prstGeom prst="rect">
-            <a:avLst/>
-          </a:prstGeom>
-          <a:noFill/>
         </p:spPr>
         <p:txBody>
-          <a:bodyPr wrap="square" rtlCol="0">
-            <a:spAutoFit/>
-          </a:bodyPr>
-          <a:lstStyle/>
-          <a:p>
+          <a:bodyPr/>
+          <a:lstStyle/>
+          <a:p>
+            <a:pPr algn="l"/>
             <a:r>
               <a:rPr lang="en-US" dirty="0" smtClean="0"/>
-              <a:t>Definitions of moment of inertia, I; deformation tensor, D; and tidal shear tensor, T. </a:t>
-            </a:r>
-            <a:r>
-              <a:rPr lang="en-US" dirty="0" err="1" smtClean="0"/>
-              <a:t>Porciani</a:t>
-            </a:r>
-            <a:r>
-              <a:rPr lang="en-US" dirty="0" smtClean="0"/>
-              <a:t> et al 2002</a:t>
+              <a:t>Thank you for listening</a:t>
             </a:r>
             <a:endParaRPr lang="en-US" dirty="0"/>
           </a:p>
@@ -3879,14 +3964,14 @@
       </p:sp>
       <p:pic>
         <p:nvPicPr>
-          <p:cNvPr id="7" name="Picture 6" descr="velocity shear or tidal tensor porciani.png"/>
+          <p:cNvPr id="4" name="Picture 3" descr="eigenvector (white arrows) of tidal field chrisari 2015.png"/>
           <p:cNvPicPr>
             <a:picLocks noChangeAspect="1"/>
           </p:cNvPicPr>
           <p:nvPr/>
         </p:nvPicPr>
         <p:blipFill>
-          <a:blip r:embed="rId4">
+          <a:blip r:embed="rId2">
             <a:extLst>
               <a:ext uri="{28A0092B-C50C-407E-A947-70E740481C1C}">
                 <a14:useLocalDpi xmlns:a14="http://schemas.microsoft.com/office/drawing/2010/main" val="0"/>
@@ -3899,18 +3984,67 @@
         </p:blipFill>
         <p:spPr>
           <a:xfrm>
-            <a:off x="1112040" y="5237108"/>
-            <a:ext cx="3335794" cy="557687"/>
+            <a:off x="0" y="961032"/>
+            <a:ext cx="9144000" cy="4724212"/>
           </a:xfrm>
           <a:prstGeom prst="rect">
             <a:avLst/>
           </a:prstGeom>
         </p:spPr>
       </p:pic>
+      <p:sp>
+        <p:nvSpPr>
+          <p:cNvPr id="5" name="TextBox 4"/>
+          <p:cNvSpPr txBox="1"/>
+          <p:nvPr/>
+        </p:nvSpPr>
+        <p:spPr>
+          <a:xfrm>
+            <a:off x="470936" y="6121367"/>
+            <a:ext cx="6376002" cy="369332"/>
+          </a:xfrm>
+          <a:prstGeom prst="rect">
+            <a:avLst/>
+          </a:prstGeom>
+          <a:noFill/>
+        </p:spPr>
+        <p:txBody>
+          <a:bodyPr wrap="none" rtlCol="0">
+            <a:spAutoFit/>
+          </a:bodyPr>
+          <a:lstStyle/>
+          <a:p>
+            <a:r>
+              <a:rPr lang="en-US" dirty="0" smtClean="0"/>
+              <a:t>Map of eigenvectors </a:t>
+            </a:r>
+            <a:r>
+              <a:rPr lang="en-US" dirty="0"/>
+              <a:t>(white arrows) of tidal </a:t>
+            </a:r>
+            <a:r>
+              <a:rPr lang="en-US" dirty="0" smtClean="0"/>
+              <a:t>field, </a:t>
+            </a:r>
+            <a:r>
+              <a:rPr lang="en-US" dirty="0" err="1" smtClean="0"/>
+              <a:t>Chisari</a:t>
+            </a:r>
+            <a:r>
+              <a:rPr lang="en-US" dirty="0" smtClean="0"/>
+              <a:t> et al </a:t>
+            </a:r>
+            <a:r>
+              <a:rPr lang="en-US" dirty="0"/>
+              <a:t>2015</a:t>
+            </a:r>
+          </a:p>
+        </p:txBody>
+      </p:sp>
     </p:spTree>
     <p:extLst>
       <p:ext uri="{BB962C8B-B14F-4D97-AF65-F5344CB8AC3E}">
-        <p14:creationId xmlns:p14="http://schemas.microsoft.com/office/powerpoint/2010/main" val="1356698628"/>
+        <p14:creationId xmlns:p14="http://schemas.microsoft.com/office/powerpoint/2010/main" val="3555104920"/>
       </p:ext>
     </p:extLst>
   </p:cSld>

</xml_diff>

<commit_message>
Added conclusion section and talked about stellar halos and radio astronomy in report, updated slides
</commit_message>
<xml_diff>
--- a/PresentationSlides.pptx
+++ b/PresentationSlides.pptx
@@ -3540,8 +3540,8 @@
         </p:nvSpPr>
         <p:spPr>
           <a:xfrm>
-            <a:off x="4296671" y="527950"/>
-            <a:ext cx="4793813" cy="3795532"/>
+            <a:off x="256875" y="684908"/>
+            <a:ext cx="8833610" cy="2612507"/>
           </a:xfrm>
         </p:spPr>
         <p:txBody>
@@ -3570,15 +3570,45 @@
           <a:p>
             <a:r>
               <a:rPr lang="en-US" sz="2400" dirty="0" smtClean="0"/>
-              <a:t>What about baryonic galaxies, or more specifically, their stellar haloes?</a:t>
+              <a:t>What about galaxies, or more specifically, stellar haloes?</a:t>
             </a:r>
             <a:endParaRPr lang="en-US" sz="2400" dirty="0"/>
+          </a:p>
+        </p:txBody>
+      </p:sp>
+      <p:sp>
+        <p:nvSpPr>
+          <p:cNvPr id="5" name="TextBox 4"/>
+          <p:cNvSpPr txBox="1"/>
+          <p:nvPr/>
+        </p:nvSpPr>
+        <p:spPr>
+          <a:xfrm>
+            <a:off x="5351540" y="3840930"/>
+            <a:ext cx="3596235" cy="2862322"/>
+          </a:xfrm>
+          <a:prstGeom prst="rect">
+            <a:avLst/>
+          </a:prstGeom>
+          <a:noFill/>
+        </p:spPr>
+        <p:txBody>
+          <a:bodyPr wrap="square" rtlCol="0">
+            <a:spAutoFit/>
+          </a:bodyPr>
+          <a:lstStyle/>
+          <a:p>
+            <a:r>
+              <a:rPr lang="en-US" sz="3000" b="1" i="1" dirty="0" smtClean="0"/>
+              <a:t>Do the structural properties of stellar haloes correlate with that of the cosmic web in which they reside?</a:t>
+            </a:r>
+            <a:endParaRPr lang="en-US" sz="3000" b="1" i="1" dirty="0"/>
           </a:p>
         </p:txBody>
       </p:sp>
       <p:pic>
         <p:nvPicPr>
-          <p:cNvPr id="4" name="Picture 3" descr="Projection of Horizon-AGN gas skeleton (galxies black dots).png"/>
+          <p:cNvPr id="7" name="Picture 6" descr="summary of satellite orientation trends chisari 2016.png"/>
           <p:cNvPicPr>
             <a:picLocks noChangeAspect="1"/>
           </p:cNvPicPr>
@@ -3598,8 +3628,8 @@
         </p:blipFill>
         <p:spPr>
           <a:xfrm>
-            <a:off x="256874" y="727715"/>
-            <a:ext cx="4039797" cy="4109449"/>
+            <a:off x="114166" y="3297415"/>
+            <a:ext cx="5094667" cy="3560585"/>
           </a:xfrm>
           <a:prstGeom prst="rect">
             <a:avLst/>
@@ -3608,14 +3638,14 @@
       </p:pic>
       <p:sp>
         <p:nvSpPr>
-          <p:cNvPr id="5" name="TextBox 4"/>
+          <p:cNvPr id="8" name="TextBox 7"/>
           <p:cNvSpPr txBox="1"/>
           <p:nvPr/>
         </p:nvSpPr>
         <p:spPr>
           <a:xfrm>
-            <a:off x="256874" y="5707568"/>
-            <a:ext cx="8690902" cy="1015663"/>
+            <a:off x="5351540" y="3226436"/>
+            <a:ext cx="3596235" cy="646331"/>
           </a:xfrm>
           <a:prstGeom prst="rect">
             <a:avLst/>
@@ -3629,39 +3659,10 @@
           <a:lstStyle/>
           <a:p>
             <a:r>
-              <a:rPr lang="en-US" sz="3000" i="1" dirty="0" smtClean="0"/>
-              <a:t>Do the structural properties of stellar haloes correlate with that of the cosmic web in which they reside?</a:t>
-            </a:r>
-            <a:endParaRPr lang="en-US" sz="3000" i="1" dirty="0"/>
-          </a:p>
-        </p:txBody>
-      </p:sp>
-      <p:sp>
-        <p:nvSpPr>
-          <p:cNvPr id="6" name="TextBox 5"/>
-          <p:cNvSpPr txBox="1"/>
-          <p:nvPr/>
-        </p:nvSpPr>
-        <p:spPr>
-          <a:xfrm>
-            <a:off x="114166" y="4965584"/>
-            <a:ext cx="4595190" cy="646331"/>
-          </a:xfrm>
-          <a:prstGeom prst="rect">
-            <a:avLst/>
-          </a:prstGeom>
-          <a:noFill/>
-        </p:spPr>
-        <p:txBody>
-          <a:bodyPr wrap="square" rtlCol="0">
-            <a:spAutoFit/>
-          </a:bodyPr>
-          <a:lstStyle/>
-          <a:p>
-            <a:r>
               <a:rPr lang="en-US" dirty="0" smtClean="0"/>
-              <a:t>Projection of Horizon-AGN gas skeleton (galaxies are black dots), Dubois et al 2014</a:t>
-            </a:r>
+              <a:t>Satellite orientation trends in a dark matter halo, Welker et al 2016</a:t>
+            </a:r>
+            <a:endParaRPr lang="en-US" dirty="0"/>
           </a:p>
         </p:txBody>
       </p:sp>
@@ -3956,7 +3957,7 @@
             <a:pPr algn="l"/>
             <a:r>
               <a:rPr lang="en-US" dirty="0" smtClean="0"/>
-              <a:t>Thank you for listening</a:t>
+              <a:t>Conclusion</a:t>
             </a:r>
             <a:endParaRPr lang="en-US" dirty="0"/>
           </a:p>
@@ -3984,7 +3985,7 @@
         </p:blipFill>
         <p:spPr>
           <a:xfrm>
-            <a:off x="0" y="961032"/>
+            <a:off x="0" y="704192"/>
             <a:ext cx="9144000" cy="4724212"/>
           </a:xfrm>
           <a:prstGeom prst="rect">
@@ -4000,7 +4001,7 @@
         </p:nvSpPr>
         <p:spPr>
           <a:xfrm>
-            <a:off x="470936" y="6121367"/>
+            <a:off x="214062" y="5456942"/>
             <a:ext cx="6376002" cy="369332"/>
           </a:xfrm>
           <a:prstGeom prst="rect">
@@ -4038,6 +4039,53 @@
               <a:rPr lang="en-US" dirty="0"/>
               <a:t>2015</a:t>
             </a:r>
+          </a:p>
+        </p:txBody>
+      </p:sp>
+      <p:sp>
+        <p:nvSpPr>
+          <p:cNvPr id="6" name="Title 1"/>
+          <p:cNvSpPr txBox="1">
+            <a:spLocks/>
+          </p:cNvSpPr>
+          <p:nvPr/>
+        </p:nvSpPr>
+        <p:spPr>
+          <a:xfrm>
+            <a:off x="914400" y="5715000"/>
+            <a:ext cx="8229600" cy="1143000"/>
+          </a:xfrm>
+          <a:prstGeom prst="rect">
+            <a:avLst/>
+          </a:prstGeom>
+        </p:spPr>
+        <p:txBody>
+          <a:bodyPr vert="horz" lIns="91440" tIns="45720" rIns="91440" bIns="45720" rtlCol="0" anchor="ctr">
+            <a:normAutofit/>
+          </a:bodyPr>
+          <a:lstStyle>
+            <a:lvl1pPr algn="ctr" defTabSz="457200" rtl="0" eaLnBrk="1" latinLnBrk="0" hangingPunct="1">
+              <a:spcBef>
+                <a:spcPct val="0"/>
+              </a:spcBef>
+              <a:buNone/>
+              <a:defRPr sz="4400" kern="1200">
+                <a:solidFill>
+                  <a:schemeClr val="tx1"/>
+                </a:solidFill>
+                <a:latin typeface="+mj-lt"/>
+                <a:ea typeface="+mj-ea"/>
+                <a:cs typeface="+mj-cs"/>
+              </a:defRPr>
+            </a:lvl1pPr>
+          </a:lstStyle>
+          <a:p>
+            <a:pPr algn="r"/>
+            <a:r>
+              <a:rPr lang="en-US" dirty="0" smtClean="0"/>
+              <a:t>Thank you for listening</a:t>
+            </a:r>
+            <a:endParaRPr lang="en-US" dirty="0"/>
           </a:p>
         </p:txBody>
       </p:sp>

</xml_diff>

<commit_message>
Added animations on slides and resources section in talk
</commit_message>
<xml_diff>
--- a/PresentationSlides.pptx
+++ b/PresentationSlides.pptx
@@ -292,7 +292,7 @@
           <a:p>
             <a:fld id="{B3B70C5C-2D4C-724E-9420-4B85B57BBEDE}" type="datetimeFigureOut">
               <a:rPr lang="en-US" smtClean="0"/>
-              <a:t>6/12/16</a:t>
+              <a:t>9/12/16</a:t>
             </a:fld>
             <a:endParaRPr lang="en-US"/>
           </a:p>
@@ -462,7 +462,7 @@
           <a:p>
             <a:fld id="{B3B70C5C-2D4C-724E-9420-4B85B57BBEDE}" type="datetimeFigureOut">
               <a:rPr lang="en-US" smtClean="0"/>
-              <a:t>6/12/16</a:t>
+              <a:t>9/12/16</a:t>
             </a:fld>
             <a:endParaRPr lang="en-US"/>
           </a:p>
@@ -642,7 +642,7 @@
           <a:p>
             <a:fld id="{B3B70C5C-2D4C-724E-9420-4B85B57BBEDE}" type="datetimeFigureOut">
               <a:rPr lang="en-US" smtClean="0"/>
-              <a:t>6/12/16</a:t>
+              <a:t>9/12/16</a:t>
             </a:fld>
             <a:endParaRPr lang="en-US"/>
           </a:p>
@@ -812,7 +812,7 @@
           <a:p>
             <a:fld id="{B3B70C5C-2D4C-724E-9420-4B85B57BBEDE}" type="datetimeFigureOut">
               <a:rPr lang="en-US" smtClean="0"/>
-              <a:t>6/12/16</a:t>
+              <a:t>9/12/16</a:t>
             </a:fld>
             <a:endParaRPr lang="en-US"/>
           </a:p>
@@ -1058,7 +1058,7 @@
           <a:p>
             <a:fld id="{B3B70C5C-2D4C-724E-9420-4B85B57BBEDE}" type="datetimeFigureOut">
               <a:rPr lang="en-US" smtClean="0"/>
-              <a:t>6/12/16</a:t>
+              <a:t>9/12/16</a:t>
             </a:fld>
             <a:endParaRPr lang="en-US"/>
           </a:p>
@@ -1346,7 +1346,7 @@
           <a:p>
             <a:fld id="{B3B70C5C-2D4C-724E-9420-4B85B57BBEDE}" type="datetimeFigureOut">
               <a:rPr lang="en-US" smtClean="0"/>
-              <a:t>6/12/16</a:t>
+              <a:t>9/12/16</a:t>
             </a:fld>
             <a:endParaRPr lang="en-US"/>
           </a:p>
@@ -1768,7 +1768,7 @@
           <a:p>
             <a:fld id="{B3B70C5C-2D4C-724E-9420-4B85B57BBEDE}" type="datetimeFigureOut">
               <a:rPr lang="en-US" smtClean="0"/>
-              <a:t>6/12/16</a:t>
+              <a:t>9/12/16</a:t>
             </a:fld>
             <a:endParaRPr lang="en-US"/>
           </a:p>
@@ -1886,7 +1886,7 @@
           <a:p>
             <a:fld id="{B3B70C5C-2D4C-724E-9420-4B85B57BBEDE}" type="datetimeFigureOut">
               <a:rPr lang="en-US" smtClean="0"/>
-              <a:t>6/12/16</a:t>
+              <a:t>9/12/16</a:t>
             </a:fld>
             <a:endParaRPr lang="en-US"/>
           </a:p>
@@ -1981,7 +1981,7 @@
           <a:p>
             <a:fld id="{B3B70C5C-2D4C-724E-9420-4B85B57BBEDE}" type="datetimeFigureOut">
               <a:rPr lang="en-US" smtClean="0"/>
-              <a:t>6/12/16</a:t>
+              <a:t>9/12/16</a:t>
             </a:fld>
             <a:endParaRPr lang="en-US"/>
           </a:p>
@@ -2258,7 +2258,7 @@
           <a:p>
             <a:fld id="{B3B70C5C-2D4C-724E-9420-4B85B57BBEDE}" type="datetimeFigureOut">
               <a:rPr lang="en-US" smtClean="0"/>
-              <a:t>6/12/16</a:t>
+              <a:t>9/12/16</a:t>
             </a:fld>
             <a:endParaRPr lang="en-US"/>
           </a:p>
@@ -2511,7 +2511,7 @@
           <a:p>
             <a:fld id="{B3B70C5C-2D4C-724E-9420-4B85B57BBEDE}" type="datetimeFigureOut">
               <a:rPr lang="en-US" smtClean="0"/>
-              <a:t>6/12/16</a:t>
+              <a:t>9/12/16</a:t>
             </a:fld>
             <a:endParaRPr lang="en-US"/>
           </a:p>
@@ -2724,7 +2724,7 @@
           <a:p>
             <a:fld id="{B3B70C5C-2D4C-724E-9420-4B85B57BBEDE}" type="datetimeFigureOut">
               <a:rPr lang="en-US" smtClean="0"/>
-              <a:t>6/12/16</a:t>
+              <a:t>9/12/16</a:t>
             </a:fld>
             <a:endParaRPr lang="en-US"/>
           </a:p>
@@ -3300,8 +3300,8 @@
         </p:nvSpPr>
         <p:spPr>
           <a:xfrm>
-            <a:off x="5660858" y="2270839"/>
-            <a:ext cx="3421420" cy="3170099"/>
+            <a:off x="5565601" y="2049348"/>
+            <a:ext cx="3421420" cy="3631763"/>
           </a:xfrm>
           <a:prstGeom prst="rect">
             <a:avLst/>
@@ -3345,7 +3345,7 @@
               <a:buChar char="•"/>
             </a:pPr>
             <a:r>
-              <a:rPr lang="en-US" sz="2500" dirty="0">
+              <a:rPr lang="en-US" sz="2400" dirty="0">
                 <a:solidFill>
                   <a:prstClr val="black"/>
                 </a:solidFill>
@@ -3362,7 +3362,7 @@
               <a:buChar char="•"/>
             </a:pPr>
             <a:r>
-              <a:rPr lang="en-US" sz="2500" dirty="0">
+              <a:rPr lang="en-US" sz="2400" dirty="0">
                 <a:solidFill>
                   <a:prstClr val="black"/>
                 </a:solidFill>
@@ -3379,7 +3379,7 @@
               <a:buChar char="•"/>
             </a:pPr>
             <a:r>
-              <a:rPr lang="en-US" sz="2500" dirty="0">
+              <a:rPr lang="en-US" sz="2400" dirty="0">
                 <a:solidFill>
                   <a:prstClr val="black"/>
                 </a:solidFill>
@@ -3387,14 +3387,31 @@
               <a:t>Weak gravitational </a:t>
             </a:r>
             <a:r>
-              <a:rPr lang="en-US" sz="2500" dirty="0" smtClean="0">
+              <a:rPr lang="en-US" sz="2400" dirty="0" smtClean="0">
                 <a:solidFill>
                   <a:prstClr val="black"/>
                 </a:solidFill>
               </a:rPr>
               <a:t>lensing</a:t>
             </a:r>
-            <a:endParaRPr lang="en-US" sz="2500" dirty="0">
+          </a:p>
+          <a:p>
+            <a:pPr marL="342900" lvl="0" indent="-342900">
+              <a:spcBef>
+                <a:spcPct val="20000"/>
+              </a:spcBef>
+              <a:buFont typeface="Arial"/>
+              <a:buChar char="•"/>
+            </a:pPr>
+            <a:r>
+              <a:rPr lang="en-US" sz="2400" dirty="0" smtClean="0">
+                <a:solidFill>
+                  <a:prstClr val="black"/>
+                </a:solidFill>
+              </a:rPr>
+              <a:t>Radio astronomy</a:t>
+            </a:r>
+            <a:endParaRPr lang="en-US" sz="2400" dirty="0">
               <a:solidFill>
                 <a:prstClr val="black"/>
               </a:solidFill>
@@ -3475,9 +3492,179 @@
   <p:timing>
     <p:tnLst>
       <p:par>
-        <p:cTn xmlns:p14="http://schemas.microsoft.com/office/powerpoint/2010/main" id="1" dur="indefinite" restart="never" nodeType="tmRoot"/>
+        <p:cTn xmlns:p14="http://schemas.microsoft.com/office/powerpoint/2010/main" id="1" dur="indefinite" restart="never" nodeType="tmRoot">
+          <p:childTnLst>
+            <p:seq concurrent="1" nextAc="seek">
+              <p:cTn id="2" dur="indefinite" nodeType="mainSeq">
+                <p:childTnLst>
+                  <p:par>
+                    <p:cTn id="3" fill="hold">
+                      <p:stCondLst>
+                        <p:cond delay="indefinite"/>
+                      </p:stCondLst>
+                      <p:childTnLst>
+                        <p:par>
+                          <p:cTn id="4" fill="hold">
+                            <p:stCondLst>
+                              <p:cond delay="0"/>
+                            </p:stCondLst>
+                            <p:childTnLst>
+                              <p:par>
+                                <p:cTn id="5" presetID="1" presetClass="entr" presetSubtype="0" fill="hold" grpId="0" nodeType="clickEffect">
+                                  <p:stCondLst>
+                                    <p:cond delay="0"/>
+                                  </p:stCondLst>
+                                  <p:childTnLst>
+                                    <p:set>
+                                      <p:cBhvr>
+                                        <p:cTn id="6" dur="1" fill="hold">
+                                          <p:stCondLst>
+                                            <p:cond delay="0"/>
+                                          </p:stCondLst>
+                                        </p:cTn>
+                                        <p:tgtEl>
+                                          <p:spTgt spid="3">
+                                            <p:txEl>
+                                              <p:pRg st="0" end="0"/>
+                                            </p:txEl>
+                                          </p:spTgt>
+                                        </p:tgtEl>
+                                        <p:attrNameLst>
+                                          <p:attrName>style.visibility</p:attrName>
+                                        </p:attrNameLst>
+                                      </p:cBhvr>
+                                      <p:to>
+                                        <p:strVal val="visible"/>
+                                      </p:to>
+                                    </p:set>
+                                  </p:childTnLst>
+                                </p:cTn>
+                              </p:par>
+                            </p:childTnLst>
+                          </p:cTn>
+                        </p:par>
+                      </p:childTnLst>
+                    </p:cTn>
+                  </p:par>
+                  <p:par>
+                    <p:cTn id="7" fill="hold">
+                      <p:stCondLst>
+                        <p:cond delay="indefinite"/>
+                      </p:stCondLst>
+                      <p:childTnLst>
+                        <p:par>
+                          <p:cTn id="8" fill="hold">
+                            <p:stCondLst>
+                              <p:cond delay="0"/>
+                            </p:stCondLst>
+                            <p:childTnLst>
+                              <p:par>
+                                <p:cTn id="9" presetID="1" presetClass="entr" presetSubtype="0" fill="hold" grpId="0" nodeType="clickEffect">
+                                  <p:stCondLst>
+                                    <p:cond delay="0"/>
+                                  </p:stCondLst>
+                                  <p:childTnLst>
+                                    <p:set>
+                                      <p:cBhvr>
+                                        <p:cTn id="10" dur="1" fill="hold">
+                                          <p:stCondLst>
+                                            <p:cond delay="0"/>
+                                          </p:stCondLst>
+                                        </p:cTn>
+                                        <p:tgtEl>
+                                          <p:spTgt spid="3">
+                                            <p:txEl>
+                                              <p:pRg st="1" end="1"/>
+                                            </p:txEl>
+                                          </p:spTgt>
+                                        </p:tgtEl>
+                                        <p:attrNameLst>
+                                          <p:attrName>style.visibility</p:attrName>
+                                        </p:attrNameLst>
+                                      </p:cBhvr>
+                                      <p:to>
+                                        <p:strVal val="visible"/>
+                                      </p:to>
+                                    </p:set>
+                                  </p:childTnLst>
+                                </p:cTn>
+                              </p:par>
+                            </p:childTnLst>
+                          </p:cTn>
+                        </p:par>
+                      </p:childTnLst>
+                    </p:cTn>
+                  </p:par>
+                  <p:par>
+                    <p:cTn id="11" fill="hold">
+                      <p:stCondLst>
+                        <p:cond delay="indefinite"/>
+                      </p:stCondLst>
+                      <p:childTnLst>
+                        <p:par>
+                          <p:cTn id="12" fill="hold">
+                            <p:stCondLst>
+                              <p:cond delay="0"/>
+                            </p:stCondLst>
+                            <p:childTnLst>
+                              <p:par>
+                                <p:cTn id="13" presetID="1" presetClass="entr" presetSubtype="0" fill="hold" grpId="0" nodeType="clickEffect">
+                                  <p:stCondLst>
+                                    <p:cond delay="0"/>
+                                  </p:stCondLst>
+                                  <p:childTnLst>
+                                    <p:set>
+                                      <p:cBhvr>
+                                        <p:cTn id="14" dur="1" fill="hold">
+                                          <p:stCondLst>
+                                            <p:cond delay="0"/>
+                                          </p:stCondLst>
+                                        </p:cTn>
+                                        <p:tgtEl>
+                                          <p:spTgt spid="6"/>
+                                        </p:tgtEl>
+                                        <p:attrNameLst>
+                                          <p:attrName>style.visibility</p:attrName>
+                                        </p:attrNameLst>
+                                      </p:cBhvr>
+                                      <p:to>
+                                        <p:strVal val="visible"/>
+                                      </p:to>
+                                    </p:set>
+                                  </p:childTnLst>
+                                </p:cTn>
+                              </p:par>
+                            </p:childTnLst>
+                          </p:cTn>
+                        </p:par>
+                      </p:childTnLst>
+                    </p:cTn>
+                  </p:par>
+                </p:childTnLst>
+              </p:cTn>
+              <p:prevCondLst>
+                <p:cond evt="onPrev" delay="0">
+                  <p:tgtEl>
+                    <p:sldTgt/>
+                  </p:tgtEl>
+                </p:cond>
+              </p:prevCondLst>
+              <p:nextCondLst>
+                <p:cond evt="onNext" delay="0">
+                  <p:tgtEl>
+                    <p:sldTgt/>
+                  </p:tgtEl>
+                </p:cond>
+              </p:nextCondLst>
+            </p:seq>
+          </p:childTnLst>
+        </p:cTn>
       </p:par>
     </p:tnLst>
+    <p:bldLst>
+      <p:bldP spid="3" grpId="0" build="p"/>
+      <p:bldP spid="6" grpId="0"/>
+    </p:bldLst>
   </p:timing>
 </p:sld>
 </file>
@@ -3679,9 +3866,277 @@
   <p:timing>
     <p:tnLst>
       <p:par>
-        <p:cTn xmlns:p14="http://schemas.microsoft.com/office/powerpoint/2010/main" id="1" dur="indefinite" restart="never" nodeType="tmRoot"/>
+        <p:cTn xmlns:p14="http://schemas.microsoft.com/office/powerpoint/2010/main" id="1" dur="indefinite" restart="never" nodeType="tmRoot">
+          <p:childTnLst>
+            <p:seq concurrent="1" nextAc="seek">
+              <p:cTn id="2" dur="indefinite" nodeType="mainSeq">
+                <p:childTnLst>
+                  <p:par>
+                    <p:cTn id="3" fill="hold">
+                      <p:stCondLst>
+                        <p:cond delay="indefinite"/>
+                      </p:stCondLst>
+                      <p:childTnLst>
+                        <p:par>
+                          <p:cTn id="4" fill="hold">
+                            <p:stCondLst>
+                              <p:cond delay="0"/>
+                            </p:stCondLst>
+                            <p:childTnLst>
+                              <p:par>
+                                <p:cTn id="5" presetID="1" presetClass="entr" presetSubtype="0" fill="hold" grpId="0" nodeType="clickEffect">
+                                  <p:stCondLst>
+                                    <p:cond delay="0"/>
+                                  </p:stCondLst>
+                                  <p:childTnLst>
+                                    <p:set>
+                                      <p:cBhvr>
+                                        <p:cTn id="6" dur="1" fill="hold">
+                                          <p:stCondLst>
+                                            <p:cond delay="0"/>
+                                          </p:stCondLst>
+                                        </p:cTn>
+                                        <p:tgtEl>
+                                          <p:spTgt spid="3">
+                                            <p:txEl>
+                                              <p:pRg st="0" end="0"/>
+                                            </p:txEl>
+                                          </p:spTgt>
+                                        </p:tgtEl>
+                                        <p:attrNameLst>
+                                          <p:attrName>style.visibility</p:attrName>
+                                        </p:attrNameLst>
+                                      </p:cBhvr>
+                                      <p:to>
+                                        <p:strVal val="visible"/>
+                                      </p:to>
+                                    </p:set>
+                                  </p:childTnLst>
+                                </p:cTn>
+                              </p:par>
+                            </p:childTnLst>
+                          </p:cTn>
+                        </p:par>
+                      </p:childTnLst>
+                    </p:cTn>
+                  </p:par>
+                  <p:par>
+                    <p:cTn id="7" fill="hold">
+                      <p:stCondLst>
+                        <p:cond delay="indefinite"/>
+                      </p:stCondLst>
+                      <p:childTnLst>
+                        <p:par>
+                          <p:cTn id="8" fill="hold">
+                            <p:stCondLst>
+                              <p:cond delay="0"/>
+                            </p:stCondLst>
+                            <p:childTnLst>
+                              <p:par>
+                                <p:cTn id="9" presetID="1" presetClass="entr" presetSubtype="0" fill="hold" grpId="0" nodeType="clickEffect">
+                                  <p:stCondLst>
+                                    <p:cond delay="0"/>
+                                  </p:stCondLst>
+                                  <p:childTnLst>
+                                    <p:set>
+                                      <p:cBhvr>
+                                        <p:cTn id="10" dur="1" fill="hold">
+                                          <p:stCondLst>
+                                            <p:cond delay="0"/>
+                                          </p:stCondLst>
+                                        </p:cTn>
+                                        <p:tgtEl>
+                                          <p:spTgt spid="3">
+                                            <p:txEl>
+                                              <p:pRg st="1" end="1"/>
+                                            </p:txEl>
+                                          </p:spTgt>
+                                        </p:tgtEl>
+                                        <p:attrNameLst>
+                                          <p:attrName>style.visibility</p:attrName>
+                                        </p:attrNameLst>
+                                      </p:cBhvr>
+                                      <p:to>
+                                        <p:strVal val="visible"/>
+                                      </p:to>
+                                    </p:set>
+                                  </p:childTnLst>
+                                </p:cTn>
+                              </p:par>
+                            </p:childTnLst>
+                          </p:cTn>
+                        </p:par>
+                      </p:childTnLst>
+                    </p:cTn>
+                  </p:par>
+                  <p:par>
+                    <p:cTn id="11" fill="hold">
+                      <p:stCondLst>
+                        <p:cond delay="indefinite"/>
+                      </p:stCondLst>
+                      <p:childTnLst>
+                        <p:par>
+                          <p:cTn id="12" fill="hold">
+                            <p:stCondLst>
+                              <p:cond delay="0"/>
+                            </p:stCondLst>
+                            <p:childTnLst>
+                              <p:par>
+                                <p:cTn id="13" presetID="1" presetClass="entr" presetSubtype="0" fill="hold" grpId="0" nodeType="clickEffect">
+                                  <p:stCondLst>
+                                    <p:cond delay="0"/>
+                                  </p:stCondLst>
+                                  <p:childTnLst>
+                                    <p:set>
+                                      <p:cBhvr>
+                                        <p:cTn id="14" dur="1" fill="hold">
+                                          <p:stCondLst>
+                                            <p:cond delay="0"/>
+                                          </p:stCondLst>
+                                        </p:cTn>
+                                        <p:tgtEl>
+                                          <p:spTgt spid="3">
+                                            <p:txEl>
+                                              <p:pRg st="2" end="2"/>
+                                            </p:txEl>
+                                          </p:spTgt>
+                                        </p:tgtEl>
+                                        <p:attrNameLst>
+                                          <p:attrName>style.visibility</p:attrName>
+                                        </p:attrNameLst>
+                                      </p:cBhvr>
+                                      <p:to>
+                                        <p:strVal val="visible"/>
+                                      </p:to>
+                                    </p:set>
+                                  </p:childTnLst>
+                                </p:cTn>
+                              </p:par>
+                            </p:childTnLst>
+                          </p:cTn>
+                        </p:par>
+                      </p:childTnLst>
+                    </p:cTn>
+                  </p:par>
+                  <p:par>
+                    <p:cTn id="15" fill="hold">
+                      <p:stCondLst>
+                        <p:cond delay="indefinite"/>
+                      </p:stCondLst>
+                      <p:childTnLst>
+                        <p:par>
+                          <p:cTn id="16" fill="hold">
+                            <p:stCondLst>
+                              <p:cond delay="0"/>
+                            </p:stCondLst>
+                            <p:childTnLst>
+                              <p:par>
+                                <p:cTn id="17" presetID="1" presetClass="entr" presetSubtype="0" fill="hold" grpId="0" nodeType="clickEffect">
+                                  <p:stCondLst>
+                                    <p:cond delay="0"/>
+                                  </p:stCondLst>
+                                  <p:childTnLst>
+                                    <p:set>
+                                      <p:cBhvr>
+                                        <p:cTn id="18" dur="1" fill="hold">
+                                          <p:stCondLst>
+                                            <p:cond delay="0"/>
+                                          </p:stCondLst>
+                                        </p:cTn>
+                                        <p:tgtEl>
+                                          <p:spTgt spid="3">
+                                            <p:txEl>
+                                              <p:pRg st="3" end="3"/>
+                                            </p:txEl>
+                                          </p:spTgt>
+                                        </p:tgtEl>
+                                        <p:attrNameLst>
+                                          <p:attrName>style.visibility</p:attrName>
+                                        </p:attrNameLst>
+                                      </p:cBhvr>
+                                      <p:to>
+                                        <p:strVal val="visible"/>
+                                      </p:to>
+                                    </p:set>
+                                  </p:childTnLst>
+                                </p:cTn>
+                              </p:par>
+                            </p:childTnLst>
+                          </p:cTn>
+                        </p:par>
+                      </p:childTnLst>
+                    </p:cTn>
+                  </p:par>
+                  <p:par>
+                    <p:cTn id="19" fill="hold">
+                      <p:stCondLst>
+                        <p:cond delay="indefinite"/>
+                      </p:stCondLst>
+                      <p:childTnLst>
+                        <p:par>
+                          <p:cTn id="20" fill="hold">
+                            <p:stCondLst>
+                              <p:cond delay="0"/>
+                            </p:stCondLst>
+                            <p:childTnLst>
+                              <p:par>
+                                <p:cTn id="21" presetID="1" presetClass="entr" presetSubtype="0" fill="hold" grpId="0" nodeType="clickEffect">
+                                  <p:stCondLst>
+                                    <p:cond delay="0"/>
+                                  </p:stCondLst>
+                                  <p:childTnLst>
+                                    <p:set>
+                                      <p:cBhvr>
+                                        <p:cTn id="22" dur="1" fill="hold">
+                                          <p:stCondLst>
+                                            <p:cond delay="0"/>
+                                          </p:stCondLst>
+                                        </p:cTn>
+                                        <p:tgtEl>
+                                          <p:spTgt spid="5"/>
+                                        </p:tgtEl>
+                                        <p:attrNameLst>
+                                          <p:attrName>style.visibility</p:attrName>
+                                        </p:attrNameLst>
+                                      </p:cBhvr>
+                                      <p:to>
+                                        <p:strVal val="visible"/>
+                                      </p:to>
+                                    </p:set>
+                                  </p:childTnLst>
+                                </p:cTn>
+                              </p:par>
+                            </p:childTnLst>
+                          </p:cTn>
+                        </p:par>
+                      </p:childTnLst>
+                    </p:cTn>
+                  </p:par>
+                </p:childTnLst>
+              </p:cTn>
+              <p:prevCondLst>
+                <p:cond evt="onPrev" delay="0">
+                  <p:tgtEl>
+                    <p:sldTgt/>
+                  </p:tgtEl>
+                </p:cond>
+              </p:prevCondLst>
+              <p:nextCondLst>
+                <p:cond evt="onNext" delay="0">
+                  <p:tgtEl>
+                    <p:sldTgt/>
+                  </p:tgtEl>
+                </p:cond>
+              </p:nextCondLst>
+            </p:seq>
+          </p:childTnLst>
+        </p:cTn>
       </p:par>
     </p:tnLst>
+    <p:bldLst>
+      <p:bldP spid="3" grpId="0" build="p"/>
+      <p:bldP spid="5" grpId="0"/>
+    </p:bldLst>
   </p:timing>
 </p:sld>
 </file>
@@ -3773,8 +4228,13 @@
             </a:r>
             <a:r>
               <a:rPr lang="en-US" sz="2400" dirty="0" smtClean="0"/>
-              <a:t>terative calculation from particle positions</a:t>
-            </a:r>
+              <a:t>terative calculation from particle </a:t>
+            </a:r>
+            <a:r>
+              <a:rPr lang="en-US" sz="2400" dirty="0" smtClean="0"/>
+              <a:t>positions</a:t>
+            </a:r>
+            <a:endParaRPr lang="en-US" sz="2400" dirty="0" smtClean="0"/>
           </a:p>
           <a:p>
             <a:r>
@@ -3786,7 +4246,11 @@
             <a:pPr lvl="1"/>
             <a:r>
               <a:rPr lang="en-US" sz="2400" dirty="0" smtClean="0"/>
-              <a:t>Smoothed kernel calculation from cosmic web</a:t>
+              <a:t>Smoothed kernel calculation from cosmic </a:t>
+            </a:r>
+            <a:r>
+              <a:rPr lang="en-US" sz="2400" dirty="0" smtClean="0"/>
+              <a:t>web</a:t>
             </a:r>
           </a:p>
         </p:txBody>
@@ -3799,7 +4263,7 @@
         </p:nvSpPr>
         <p:spPr>
           <a:xfrm>
-            <a:off x="457200" y="5978678"/>
+            <a:off x="457200" y="6134764"/>
             <a:ext cx="8229599" cy="369332"/>
           </a:xfrm>
           <a:prstGeom prst="rect">
@@ -3859,8 +4323,8 @@
         </p:blipFill>
         <p:spPr>
           <a:xfrm>
-            <a:off x="4423941" y="3246146"/>
-            <a:ext cx="3835400" cy="2501900"/>
+            <a:off x="285950" y="4001673"/>
+            <a:ext cx="3267473" cy="2131431"/>
           </a:xfrm>
           <a:prstGeom prst="rect">
             <a:avLst/>
@@ -3889,14 +4353,79 @@
         </p:blipFill>
         <p:spPr>
           <a:xfrm>
-            <a:off x="457200" y="3963850"/>
-            <a:ext cx="3966741" cy="1098820"/>
+            <a:off x="285950" y="3294871"/>
+            <a:ext cx="3267473" cy="905117"/>
           </a:xfrm>
           <a:prstGeom prst="rect">
             <a:avLst/>
           </a:prstGeom>
         </p:spPr>
       </p:pic>
+      <p:sp>
+        <p:nvSpPr>
+          <p:cNvPr id="4" name="TextBox 3"/>
+          <p:cNvSpPr txBox="1"/>
+          <p:nvPr/>
+        </p:nvSpPr>
+        <p:spPr>
+          <a:xfrm>
+            <a:off x="3738944" y="3319509"/>
+            <a:ext cx="4947856" cy="2477602"/>
+          </a:xfrm>
+          <a:prstGeom prst="rect">
+            <a:avLst/>
+          </a:prstGeom>
+          <a:noFill/>
+        </p:spPr>
+        <p:txBody>
+          <a:bodyPr wrap="square" rtlCol="0">
+            <a:spAutoFit/>
+          </a:bodyPr>
+          <a:lstStyle/>
+          <a:p>
+            <a:r>
+              <a:rPr lang="en-US" sz="3500" dirty="0" smtClean="0"/>
+              <a:t>RESOURCES?</a:t>
+            </a:r>
+          </a:p>
+          <a:p>
+            <a:pPr marL="342900" indent="-342900">
+              <a:buFont typeface="Arial"/>
+              <a:buChar char="•"/>
+            </a:pPr>
+            <a:r>
+              <a:rPr lang="en-US" sz="2400" dirty="0" smtClean="0"/>
+              <a:t>Horizon-AGN simulation data located on Magnus at </a:t>
+            </a:r>
+            <a:r>
+              <a:rPr lang="en-US" sz="2400" dirty="0" err="1" smtClean="0"/>
+              <a:t>Pawsey</a:t>
+            </a:r>
+            <a:endParaRPr lang="en-US" sz="2400" dirty="0"/>
+          </a:p>
+          <a:p>
+            <a:pPr marL="342900" indent="-342900">
+              <a:buFont typeface="Arial"/>
+              <a:buChar char="•"/>
+            </a:pPr>
+            <a:r>
+              <a:rPr lang="en-US" sz="2400" dirty="0" smtClean="0"/>
+              <a:t>Structural quantities calculated for large data sets</a:t>
+            </a:r>
+          </a:p>
+          <a:p>
+            <a:pPr marL="342900" indent="-342900">
+              <a:buFont typeface="Arial"/>
+              <a:buChar char="•"/>
+            </a:pPr>
+            <a:r>
+              <a:rPr lang="en-US" sz="2400" dirty="0" smtClean="0"/>
+              <a:t>Visualization of cosmic web </a:t>
+            </a:r>
+            <a:endParaRPr lang="en-US" sz="2400" dirty="0"/>
+          </a:p>
+        </p:txBody>
+      </p:sp>
     </p:spTree>
     <p:extLst>
       <p:ext uri="{BB962C8B-B14F-4D97-AF65-F5344CB8AC3E}">
@@ -3910,9 +4439,390 @@
   <p:timing>
     <p:tnLst>
       <p:par>
-        <p:cTn xmlns:p14="http://schemas.microsoft.com/office/powerpoint/2010/main" id="1" dur="indefinite" restart="never" nodeType="tmRoot"/>
+        <p:cTn xmlns:p14="http://schemas.microsoft.com/office/powerpoint/2010/main" id="1" dur="indefinite" restart="never" nodeType="tmRoot">
+          <p:childTnLst>
+            <p:seq concurrent="1" nextAc="seek">
+              <p:cTn id="2" dur="indefinite" nodeType="mainSeq">
+                <p:childTnLst>
+                  <p:par>
+                    <p:cTn id="3" fill="hold">
+                      <p:stCondLst>
+                        <p:cond delay="indefinite"/>
+                      </p:stCondLst>
+                      <p:childTnLst>
+                        <p:par>
+                          <p:cTn id="4" fill="hold">
+                            <p:stCondLst>
+                              <p:cond delay="0"/>
+                            </p:stCondLst>
+                            <p:childTnLst>
+                              <p:par>
+                                <p:cTn id="5" presetID="1" presetClass="entr" presetSubtype="0" fill="hold" grpId="0" nodeType="clickEffect">
+                                  <p:stCondLst>
+                                    <p:cond delay="0"/>
+                                  </p:stCondLst>
+                                  <p:childTnLst>
+                                    <p:set>
+                                      <p:cBhvr>
+                                        <p:cTn id="6" dur="1" fill="hold">
+                                          <p:stCondLst>
+                                            <p:cond delay="0"/>
+                                          </p:stCondLst>
+                                        </p:cTn>
+                                        <p:tgtEl>
+                                          <p:spTgt spid="3">
+                                            <p:txEl>
+                                              <p:pRg st="0" end="0"/>
+                                            </p:txEl>
+                                          </p:spTgt>
+                                        </p:tgtEl>
+                                        <p:attrNameLst>
+                                          <p:attrName>style.visibility</p:attrName>
+                                        </p:attrNameLst>
+                                      </p:cBhvr>
+                                      <p:to>
+                                        <p:strVal val="visible"/>
+                                      </p:to>
+                                    </p:set>
+                                  </p:childTnLst>
+                                </p:cTn>
+                              </p:par>
+                            </p:childTnLst>
+                          </p:cTn>
+                        </p:par>
+                      </p:childTnLst>
+                    </p:cTn>
+                  </p:par>
+                  <p:par>
+                    <p:cTn id="7" fill="hold">
+                      <p:stCondLst>
+                        <p:cond delay="indefinite"/>
+                      </p:stCondLst>
+                      <p:childTnLst>
+                        <p:par>
+                          <p:cTn id="8" fill="hold">
+                            <p:stCondLst>
+                              <p:cond delay="0"/>
+                            </p:stCondLst>
+                            <p:childTnLst>
+                              <p:par>
+                                <p:cTn id="9" presetID="1" presetClass="entr" presetSubtype="0" fill="hold" grpId="0" nodeType="clickEffect">
+                                  <p:stCondLst>
+                                    <p:cond delay="0"/>
+                                  </p:stCondLst>
+                                  <p:childTnLst>
+                                    <p:set>
+                                      <p:cBhvr>
+                                        <p:cTn id="10" dur="1" fill="hold">
+                                          <p:stCondLst>
+                                            <p:cond delay="0"/>
+                                          </p:stCondLst>
+                                        </p:cTn>
+                                        <p:tgtEl>
+                                          <p:spTgt spid="3">
+                                            <p:txEl>
+                                              <p:pRg st="1" end="1"/>
+                                            </p:txEl>
+                                          </p:spTgt>
+                                        </p:tgtEl>
+                                        <p:attrNameLst>
+                                          <p:attrName>style.visibility</p:attrName>
+                                        </p:attrNameLst>
+                                      </p:cBhvr>
+                                      <p:to>
+                                        <p:strVal val="visible"/>
+                                      </p:to>
+                                    </p:set>
+                                  </p:childTnLst>
+                                </p:cTn>
+                              </p:par>
+                              <p:par>
+                                <p:cTn id="11" presetID="1" presetClass="entr" presetSubtype="0" fill="hold" grpId="0" nodeType="withEffect">
+                                  <p:stCondLst>
+                                    <p:cond delay="0"/>
+                                  </p:stCondLst>
+                                  <p:childTnLst>
+                                    <p:set>
+                                      <p:cBhvr>
+                                        <p:cTn id="12" dur="1" fill="hold">
+                                          <p:stCondLst>
+                                            <p:cond delay="0"/>
+                                          </p:stCondLst>
+                                        </p:cTn>
+                                        <p:tgtEl>
+                                          <p:spTgt spid="3">
+                                            <p:txEl>
+                                              <p:pRg st="2" end="2"/>
+                                            </p:txEl>
+                                          </p:spTgt>
+                                        </p:tgtEl>
+                                        <p:attrNameLst>
+                                          <p:attrName>style.visibility</p:attrName>
+                                        </p:attrNameLst>
+                                      </p:cBhvr>
+                                      <p:to>
+                                        <p:strVal val="visible"/>
+                                      </p:to>
+                                    </p:set>
+                                  </p:childTnLst>
+                                </p:cTn>
+                              </p:par>
+                            </p:childTnLst>
+                          </p:cTn>
+                        </p:par>
+                      </p:childTnLst>
+                    </p:cTn>
+                  </p:par>
+                  <p:par>
+                    <p:cTn id="13" fill="hold">
+                      <p:stCondLst>
+                        <p:cond delay="indefinite"/>
+                      </p:stCondLst>
+                      <p:childTnLst>
+                        <p:par>
+                          <p:cTn id="14" fill="hold">
+                            <p:stCondLst>
+                              <p:cond delay="0"/>
+                            </p:stCondLst>
+                            <p:childTnLst>
+                              <p:par>
+                                <p:cTn id="15" presetID="1" presetClass="entr" presetSubtype="0" fill="hold" grpId="0" nodeType="clickEffect">
+                                  <p:stCondLst>
+                                    <p:cond delay="0"/>
+                                  </p:stCondLst>
+                                  <p:childTnLst>
+                                    <p:set>
+                                      <p:cBhvr>
+                                        <p:cTn id="16" dur="1" fill="hold">
+                                          <p:stCondLst>
+                                            <p:cond delay="0"/>
+                                          </p:stCondLst>
+                                        </p:cTn>
+                                        <p:tgtEl>
+                                          <p:spTgt spid="3">
+                                            <p:txEl>
+                                              <p:pRg st="3" end="3"/>
+                                            </p:txEl>
+                                          </p:spTgt>
+                                        </p:tgtEl>
+                                        <p:attrNameLst>
+                                          <p:attrName>style.visibility</p:attrName>
+                                        </p:attrNameLst>
+                                      </p:cBhvr>
+                                      <p:to>
+                                        <p:strVal val="visible"/>
+                                      </p:to>
+                                    </p:set>
+                                  </p:childTnLst>
+                                </p:cTn>
+                              </p:par>
+                              <p:par>
+                                <p:cTn id="17" presetID="1" presetClass="entr" presetSubtype="0" fill="hold" grpId="0" nodeType="withEffect">
+                                  <p:stCondLst>
+                                    <p:cond delay="0"/>
+                                  </p:stCondLst>
+                                  <p:childTnLst>
+                                    <p:set>
+                                      <p:cBhvr>
+                                        <p:cTn id="18" dur="1" fill="hold">
+                                          <p:stCondLst>
+                                            <p:cond delay="0"/>
+                                          </p:stCondLst>
+                                        </p:cTn>
+                                        <p:tgtEl>
+                                          <p:spTgt spid="3">
+                                            <p:txEl>
+                                              <p:pRg st="4" end="4"/>
+                                            </p:txEl>
+                                          </p:spTgt>
+                                        </p:tgtEl>
+                                        <p:attrNameLst>
+                                          <p:attrName>style.visibility</p:attrName>
+                                        </p:attrNameLst>
+                                      </p:cBhvr>
+                                      <p:to>
+                                        <p:strVal val="visible"/>
+                                      </p:to>
+                                    </p:set>
+                                  </p:childTnLst>
+                                </p:cTn>
+                              </p:par>
+                            </p:childTnLst>
+                          </p:cTn>
+                        </p:par>
+                      </p:childTnLst>
+                    </p:cTn>
+                  </p:par>
+                  <p:par>
+                    <p:cTn id="19" fill="hold">
+                      <p:stCondLst>
+                        <p:cond delay="indefinite"/>
+                      </p:stCondLst>
+                      <p:childTnLst>
+                        <p:par>
+                          <p:cTn id="20" fill="hold">
+                            <p:stCondLst>
+                              <p:cond delay="0"/>
+                            </p:stCondLst>
+                            <p:childTnLst>
+                              <p:par>
+                                <p:cTn id="21" presetID="1" presetClass="entr" presetSubtype="0" fill="hold" nodeType="clickEffect">
+                                  <p:stCondLst>
+                                    <p:cond delay="0"/>
+                                  </p:stCondLst>
+                                  <p:childTnLst>
+                                    <p:set>
+                                      <p:cBhvr>
+                                        <p:cTn id="22" dur="1" fill="hold">
+                                          <p:stCondLst>
+                                            <p:cond delay="0"/>
+                                          </p:stCondLst>
+                                        </p:cTn>
+                                        <p:tgtEl>
+                                          <p:spTgt spid="9"/>
+                                        </p:tgtEl>
+                                        <p:attrNameLst>
+                                          <p:attrName>style.visibility</p:attrName>
+                                        </p:attrNameLst>
+                                      </p:cBhvr>
+                                      <p:to>
+                                        <p:strVal val="visible"/>
+                                      </p:to>
+                                    </p:set>
+                                  </p:childTnLst>
+                                </p:cTn>
+                              </p:par>
+                              <p:par>
+                                <p:cTn id="23" presetID="1" presetClass="entr" presetSubtype="0" fill="hold" nodeType="withEffect">
+                                  <p:stCondLst>
+                                    <p:cond delay="0"/>
+                                  </p:stCondLst>
+                                  <p:childTnLst>
+                                    <p:set>
+                                      <p:cBhvr>
+                                        <p:cTn id="24" dur="1" fill="hold">
+                                          <p:stCondLst>
+                                            <p:cond delay="0"/>
+                                          </p:stCondLst>
+                                        </p:cTn>
+                                        <p:tgtEl>
+                                          <p:spTgt spid="8"/>
+                                        </p:tgtEl>
+                                        <p:attrNameLst>
+                                          <p:attrName>style.visibility</p:attrName>
+                                        </p:attrNameLst>
+                                      </p:cBhvr>
+                                      <p:to>
+                                        <p:strVal val="visible"/>
+                                      </p:to>
+                                    </p:set>
+                                  </p:childTnLst>
+                                </p:cTn>
+                              </p:par>
+                              <p:par>
+                                <p:cTn id="25" presetID="1" presetClass="entr" presetSubtype="0" fill="hold" grpId="0" nodeType="withEffect">
+                                  <p:stCondLst>
+                                    <p:cond delay="0"/>
+                                  </p:stCondLst>
+                                  <p:childTnLst>
+                                    <p:set>
+                                      <p:cBhvr>
+                                        <p:cTn id="26" dur="1" fill="hold">
+                                          <p:stCondLst>
+                                            <p:cond delay="0"/>
+                                          </p:stCondLst>
+                                        </p:cTn>
+                                        <p:tgtEl>
+                                          <p:spTgt spid="6"/>
+                                        </p:tgtEl>
+                                        <p:attrNameLst>
+                                          <p:attrName>style.visibility</p:attrName>
+                                        </p:attrNameLst>
+                                      </p:cBhvr>
+                                      <p:to>
+                                        <p:strVal val="visible"/>
+                                      </p:to>
+                                    </p:set>
+                                  </p:childTnLst>
+                                </p:cTn>
+                              </p:par>
+                            </p:childTnLst>
+                          </p:cTn>
+                        </p:par>
+                      </p:childTnLst>
+                    </p:cTn>
+                  </p:par>
+                  <p:par>
+                    <p:cTn id="27" fill="hold">
+                      <p:stCondLst>
+                        <p:cond delay="indefinite"/>
+                      </p:stCondLst>
+                      <p:childTnLst>
+                        <p:par>
+                          <p:cTn id="28" fill="hold">
+                            <p:stCondLst>
+                              <p:cond delay="0"/>
+                            </p:stCondLst>
+                            <p:childTnLst>
+                              <p:par>
+                                <p:cTn id="29" presetID="1" presetClass="entr" presetSubtype="0" fill="hold" grpId="0" nodeType="clickEffect">
+                                  <p:stCondLst>
+                                    <p:cond delay="0"/>
+                                  </p:stCondLst>
+                                  <p:childTnLst>
+                                    <p:set>
+                                      <p:cBhvr>
+                                        <p:cTn id="30" dur="1" fill="hold">
+                                          <p:stCondLst>
+                                            <p:cond delay="0"/>
+                                          </p:stCondLst>
+                                        </p:cTn>
+                                        <p:tgtEl>
+                                          <p:spTgt spid="4"/>
+                                        </p:tgtEl>
+                                        <p:attrNameLst>
+                                          <p:attrName>style.visibility</p:attrName>
+                                        </p:attrNameLst>
+                                      </p:cBhvr>
+                                      <p:to>
+                                        <p:strVal val="visible"/>
+                                      </p:to>
+                                    </p:set>
+                                  </p:childTnLst>
+                                </p:cTn>
+                              </p:par>
+                            </p:childTnLst>
+                          </p:cTn>
+                        </p:par>
+                      </p:childTnLst>
+                    </p:cTn>
+                  </p:par>
+                </p:childTnLst>
+              </p:cTn>
+              <p:prevCondLst>
+                <p:cond evt="onPrev" delay="0">
+                  <p:tgtEl>
+                    <p:sldTgt/>
+                  </p:tgtEl>
+                </p:cond>
+              </p:prevCondLst>
+              <p:nextCondLst>
+                <p:cond evt="onNext" delay="0">
+                  <p:tgtEl>
+                    <p:sldTgt/>
+                  </p:tgtEl>
+                </p:cond>
+              </p:nextCondLst>
+            </p:seq>
+          </p:childTnLst>
+        </p:cTn>
       </p:par>
     </p:tnLst>
+    <p:bldLst>
+      <p:bldP spid="3" grpId="0" build="p"/>
+      <p:bldP spid="6" grpId="0"/>
+      <p:bldP spid="4" grpId="0"/>
+    </p:bldLst>
   </p:timing>
 </p:sld>
 </file>
@@ -4099,6 +5009,84 @@
   <p:clrMapOvr>
     <a:masterClrMapping/>
   </p:clrMapOvr>
+  <p:timing>
+    <p:tnLst>
+      <p:par>
+        <p:cTn xmlns:p14="http://schemas.microsoft.com/office/powerpoint/2010/main" id="1" dur="indefinite" restart="never" nodeType="tmRoot">
+          <p:childTnLst>
+            <p:seq concurrent="1" nextAc="seek">
+              <p:cTn id="2" dur="indefinite" nodeType="mainSeq">
+                <p:childTnLst>
+                  <p:par>
+                    <p:cTn id="3" fill="hold">
+                      <p:stCondLst>
+                        <p:cond delay="indefinite"/>
+                      </p:stCondLst>
+                      <p:childTnLst>
+                        <p:par>
+                          <p:cTn id="4" fill="hold">
+                            <p:stCondLst>
+                              <p:cond delay="0"/>
+                            </p:stCondLst>
+                            <p:childTnLst>
+                              <p:par>
+                                <p:cTn id="5" presetID="1" presetClass="entr" presetSubtype="0" fill="hold" grpId="0" nodeType="clickEffect">
+                                  <p:stCondLst>
+                                    <p:cond delay="0"/>
+                                  </p:stCondLst>
+                                  <p:childTnLst>
+                                    <p:set>
+                                      <p:cBhvr>
+                                        <p:cTn id="6" dur="1" fill="hold">
+                                          <p:stCondLst>
+                                            <p:cond delay="0"/>
+                                          </p:stCondLst>
+                                        </p:cTn>
+                                        <p:tgtEl>
+                                          <p:spTgt spid="6"/>
+                                        </p:tgtEl>
+                                        <p:attrNameLst>
+                                          <p:attrName>style.visibility</p:attrName>
+                                        </p:attrNameLst>
+                                      </p:cBhvr>
+                                      <p:to>
+                                        <p:strVal val="visible"/>
+                                      </p:to>
+                                    </p:set>
+                                  </p:childTnLst>
+                                </p:cTn>
+                              </p:par>
+                            </p:childTnLst>
+                          </p:cTn>
+                        </p:par>
+                      </p:childTnLst>
+                    </p:cTn>
+                  </p:par>
+                </p:childTnLst>
+              </p:cTn>
+              <p:prevCondLst>
+                <p:cond evt="onPrev" delay="0">
+                  <p:tgtEl>
+                    <p:sldTgt/>
+                  </p:tgtEl>
+                </p:cond>
+              </p:prevCondLst>
+              <p:nextCondLst>
+                <p:cond evt="onNext" delay="0">
+                  <p:tgtEl>
+                    <p:sldTgt/>
+                  </p:tgtEl>
+                </p:cond>
+              </p:nextCondLst>
+            </p:seq>
+          </p:childTnLst>
+        </p:cTn>
+      </p:par>
+    </p:tnLst>
+    <p:bldLst>
+      <p:bldP spid="6" grpId="0"/>
+    </p:bldLst>
+  </p:timing>
 </p:sld>
 </file>
 

</xml_diff>

<commit_message>
Resaved presentation slides after powerpoint glitch
</commit_message>
<xml_diff>
--- a/PresentationSlides.pptx
+++ b/PresentationSlides.pptx
@@ -4228,13 +4228,8 @@
             </a:r>
             <a:r>
               <a:rPr lang="en-US" sz="2400" dirty="0" smtClean="0"/>
-              <a:t>terative calculation from particle </a:t>
-            </a:r>
-            <a:r>
-              <a:rPr lang="en-US" sz="2400" dirty="0" smtClean="0"/>
-              <a:t>positions</a:t>
-            </a:r>
-            <a:endParaRPr lang="en-US" sz="2400" dirty="0" smtClean="0"/>
+              <a:t>terative calculation from particle positions</a:t>
+            </a:r>
           </a:p>
           <a:p>
             <a:r>
@@ -4246,11 +4241,7 @@
             <a:pPr lvl="1"/>
             <a:r>
               <a:rPr lang="en-US" sz="2400" dirty="0" smtClean="0"/>
-              <a:t>Smoothed kernel calculation from cosmic </a:t>
-            </a:r>
-            <a:r>
-              <a:rPr lang="en-US" sz="2400" dirty="0" smtClean="0"/>
-              <a:t>web</a:t>
+              <a:t>Smoothed kernel calculation from cosmic web</a:t>
             </a:r>
           </a:p>
         </p:txBody>

</xml_diff>

<commit_message>
Added presentation slides and speech, as well as LIT REVIEW and Project Aims file
</commit_message>
<xml_diff>
--- a/PresentationSlides.pptx
+++ b/PresentationSlides.pptx
@@ -292,7 +292,7 @@
           <a:p>
             <a:fld id="{B3B70C5C-2D4C-724E-9420-4B85B57BBEDE}" type="datetimeFigureOut">
               <a:rPr lang="en-US" smtClean="0"/>
-              <a:t>9/12/16</a:t>
+              <a:t>12/12/16</a:t>
             </a:fld>
             <a:endParaRPr lang="en-US"/>
           </a:p>
@@ -462,7 +462,7 @@
           <a:p>
             <a:fld id="{B3B70C5C-2D4C-724E-9420-4B85B57BBEDE}" type="datetimeFigureOut">
               <a:rPr lang="en-US" smtClean="0"/>
-              <a:t>9/12/16</a:t>
+              <a:t>12/12/16</a:t>
             </a:fld>
             <a:endParaRPr lang="en-US"/>
           </a:p>
@@ -642,7 +642,7 @@
           <a:p>
             <a:fld id="{B3B70C5C-2D4C-724E-9420-4B85B57BBEDE}" type="datetimeFigureOut">
               <a:rPr lang="en-US" smtClean="0"/>
-              <a:t>9/12/16</a:t>
+              <a:t>12/12/16</a:t>
             </a:fld>
             <a:endParaRPr lang="en-US"/>
           </a:p>
@@ -812,7 +812,7 @@
           <a:p>
             <a:fld id="{B3B70C5C-2D4C-724E-9420-4B85B57BBEDE}" type="datetimeFigureOut">
               <a:rPr lang="en-US" smtClean="0"/>
-              <a:t>9/12/16</a:t>
+              <a:t>12/12/16</a:t>
             </a:fld>
             <a:endParaRPr lang="en-US"/>
           </a:p>
@@ -1058,7 +1058,7 @@
           <a:p>
             <a:fld id="{B3B70C5C-2D4C-724E-9420-4B85B57BBEDE}" type="datetimeFigureOut">
               <a:rPr lang="en-US" smtClean="0"/>
-              <a:t>9/12/16</a:t>
+              <a:t>12/12/16</a:t>
             </a:fld>
             <a:endParaRPr lang="en-US"/>
           </a:p>
@@ -1346,7 +1346,7 @@
           <a:p>
             <a:fld id="{B3B70C5C-2D4C-724E-9420-4B85B57BBEDE}" type="datetimeFigureOut">
               <a:rPr lang="en-US" smtClean="0"/>
-              <a:t>9/12/16</a:t>
+              <a:t>12/12/16</a:t>
             </a:fld>
             <a:endParaRPr lang="en-US"/>
           </a:p>
@@ -1768,7 +1768,7 @@
           <a:p>
             <a:fld id="{B3B70C5C-2D4C-724E-9420-4B85B57BBEDE}" type="datetimeFigureOut">
               <a:rPr lang="en-US" smtClean="0"/>
-              <a:t>9/12/16</a:t>
+              <a:t>12/12/16</a:t>
             </a:fld>
             <a:endParaRPr lang="en-US"/>
           </a:p>
@@ -1886,7 +1886,7 @@
           <a:p>
             <a:fld id="{B3B70C5C-2D4C-724E-9420-4B85B57BBEDE}" type="datetimeFigureOut">
               <a:rPr lang="en-US" smtClean="0"/>
-              <a:t>9/12/16</a:t>
+              <a:t>12/12/16</a:t>
             </a:fld>
             <a:endParaRPr lang="en-US"/>
           </a:p>
@@ -1981,7 +1981,7 @@
           <a:p>
             <a:fld id="{B3B70C5C-2D4C-724E-9420-4B85B57BBEDE}" type="datetimeFigureOut">
               <a:rPr lang="en-US" smtClean="0"/>
-              <a:t>9/12/16</a:t>
+              <a:t>12/12/16</a:t>
             </a:fld>
             <a:endParaRPr lang="en-US"/>
           </a:p>
@@ -2258,7 +2258,7 @@
           <a:p>
             <a:fld id="{B3B70C5C-2D4C-724E-9420-4B85B57BBEDE}" type="datetimeFigureOut">
               <a:rPr lang="en-US" smtClean="0"/>
-              <a:t>9/12/16</a:t>
+              <a:t>12/12/16</a:t>
             </a:fld>
             <a:endParaRPr lang="en-US"/>
           </a:p>
@@ -2511,7 +2511,7 @@
           <a:p>
             <a:fld id="{B3B70C5C-2D4C-724E-9420-4B85B57BBEDE}" type="datetimeFigureOut">
               <a:rPr lang="en-US" smtClean="0"/>
-              <a:t>9/12/16</a:t>
+              <a:t>12/12/16</a:t>
             </a:fld>
             <a:endParaRPr lang="en-US"/>
           </a:p>
@@ -2724,7 +2724,7 @@
           <a:p>
             <a:fld id="{B3B70C5C-2D4C-724E-9420-4B85B57BBEDE}" type="datetimeFigureOut">
               <a:rPr lang="en-US" smtClean="0"/>
-              <a:t>9/12/16</a:t>
+              <a:t>12/12/16</a:t>
             </a:fld>
             <a:endParaRPr lang="en-US"/>
           </a:p>
@@ -3787,7 +3787,7 @@
           <a:p>
             <a:r>
               <a:rPr lang="en-US" sz="3000" b="1" i="1" dirty="0" smtClean="0"/>
-              <a:t>Do the structural properties of stellar haloes correlate with that of the cosmic web in which they reside?</a:t>
+              <a:t>Do the structural properties of stellar haloes correlate with those of the cosmic web in which they reside?</a:t>
             </a:r>
             <a:endParaRPr lang="en-US" sz="3000" b="1" i="1" dirty="0"/>
           </a:p>
@@ -4360,7 +4360,7 @@
         </p:nvSpPr>
         <p:spPr>
           <a:xfrm>
-            <a:off x="3738944" y="3319509"/>
+            <a:off x="4052901" y="3336428"/>
             <a:ext cx="4947856" cy="2477602"/>
           </a:xfrm>
           <a:prstGeom prst="rect">
@@ -4417,6 +4417,93 @@
           </a:p>
         </p:txBody>
       </p:sp>
+      <p:grpSp>
+        <p:nvGrpSpPr>
+          <p:cNvPr id="7" name="Group 6"/>
+          <p:cNvGrpSpPr/>
+          <p:nvPr/>
+        </p:nvGrpSpPr>
+        <p:grpSpPr>
+          <a:xfrm>
+            <a:off x="171785" y="1426865"/>
+            <a:ext cx="8828971" cy="4561453"/>
+            <a:chOff x="171785" y="1426865"/>
+            <a:chExt cx="8828971" cy="4561453"/>
+          </a:xfrm>
+        </p:grpSpPr>
+        <p:pic>
+          <p:nvPicPr>
+            <p:cNvPr id="5" name="Picture 4" descr="eigenvector (white arrows) of tidal field chrisari 2015.png"/>
+            <p:cNvPicPr>
+              <a:picLocks noChangeAspect="1"/>
+            </p:cNvPicPr>
+            <p:nvPr/>
+          </p:nvPicPr>
+          <p:blipFill>
+            <a:blip r:embed="rId4">
+              <a:extLst>
+                <a:ext uri="{28A0092B-C50C-407E-A947-70E740481C1C}">
+                  <a14:useLocalDpi xmlns:a14="http://schemas.microsoft.com/office/drawing/2010/main" val="0"/>
+                </a:ext>
+              </a:extLst>
+            </a:blip>
+            <a:stretch>
+              <a:fillRect/>
+            </a:stretch>
+          </p:blipFill>
+          <p:spPr>
+            <a:xfrm>
+              <a:off x="171785" y="1426865"/>
+              <a:ext cx="8828971" cy="4561453"/>
+            </a:xfrm>
+            <a:prstGeom prst="rect">
+              <a:avLst/>
+            </a:prstGeom>
+          </p:spPr>
+        </p:pic>
+        <p:sp>
+          <p:nvSpPr>
+            <p:cNvPr id="10" name="TextBox 9"/>
+            <p:cNvSpPr txBox="1"/>
+            <p:nvPr/>
+          </p:nvSpPr>
+          <p:spPr>
+            <a:xfrm>
+              <a:off x="1955632" y="5444698"/>
+              <a:ext cx="5379547" cy="369332"/>
+            </a:xfrm>
+            <a:prstGeom prst="rect">
+              <a:avLst/>
+            </a:prstGeom>
+            <a:noFill/>
+          </p:spPr>
+          <p:txBody>
+            <a:bodyPr wrap="square" rtlCol="0">
+              <a:spAutoFit/>
+            </a:bodyPr>
+            <a:lstStyle/>
+            <a:p>
+              <a:r>
+                <a:rPr lang="en-US" b="1" dirty="0" smtClean="0"/>
+                <a:t>Eigenvectors tidal </a:t>
+              </a:r>
+              <a:r>
+                <a:rPr lang="en-US" b="1" dirty="0" smtClean="0"/>
+                <a:t>shear tensor, T. </a:t>
+              </a:r>
+              <a:r>
+                <a:rPr lang="en-US" b="1" dirty="0" err="1" smtClean="0"/>
+                <a:t>Chisari</a:t>
+              </a:r>
+              <a:r>
+                <a:rPr lang="en-US" b="1" dirty="0" smtClean="0"/>
+                <a:t> et al 2015</a:t>
+              </a:r>
+              <a:endParaRPr lang="en-US" b="1" dirty="0"/>
+            </a:p>
+          </p:txBody>
+        </p:sp>
+      </p:grpSp>
     </p:spTree>
     <p:extLst>
       <p:ext uri="{BB962C8B-B14F-4D97-AF65-F5344CB8AC3E}">
@@ -4788,6 +4875,51 @@
                       </p:childTnLst>
                     </p:cTn>
                   </p:par>
+                  <p:par>
+                    <p:cTn id="31" fill="hold">
+                      <p:stCondLst>
+                        <p:cond delay="indefinite"/>
+                      </p:stCondLst>
+                      <p:childTnLst>
+                        <p:par>
+                          <p:cTn id="32" fill="hold">
+                            <p:stCondLst>
+                              <p:cond delay="0"/>
+                            </p:stCondLst>
+                            <p:childTnLst>
+                              <p:par>
+                                <p:cTn id="33" presetID="1" presetClass="entr" presetSubtype="0" fill="hold" nodeType="clickEffect">
+                                  <p:stCondLst>
+                                    <p:cond delay="0"/>
+                                  </p:stCondLst>
+                                  <p:childTnLst>
+                                    <p:set>
+                                      <p:cBhvr>
+                                        <p:cTn id="34" dur="1" fill="hold">
+                                          <p:stCondLst>
+                                            <p:cond delay="0"/>
+                                          </p:stCondLst>
+                                        </p:cTn>
+                                        <p:tgtEl>
+                                          <p:spTgt spid="7"/>
+                                        </p:tgtEl>
+                                        <p:attrNameLst>
+                                          <p:attrName>style.visibility</p:attrName>
+                                        </p:attrNameLst>
+                                      </p:cBhvr>
+                                      <p:to>
+                                        <p:strVal val="visible"/>
+                                      </p:to>
+                                    </p:set>
+                                  </p:childTnLst>
+                                </p:cTn>
+                              </p:par>
+                            </p:childTnLst>
+                          </p:cTn>
+                        </p:par>
+                      </p:childTnLst>
+                    </p:cTn>
+                  </p:par>
                 </p:childTnLst>
               </p:cTn>
               <p:prevCondLst>
@@ -4864,9 +4996,56 @@
           </a:p>
         </p:txBody>
       </p:sp>
+      <p:sp>
+        <p:nvSpPr>
+          <p:cNvPr id="6" name="Title 1"/>
+          <p:cNvSpPr txBox="1">
+            <a:spLocks/>
+          </p:cNvSpPr>
+          <p:nvPr/>
+        </p:nvSpPr>
+        <p:spPr>
+          <a:xfrm>
+            <a:off x="914400" y="5715000"/>
+            <a:ext cx="8229600" cy="1143000"/>
+          </a:xfrm>
+          <a:prstGeom prst="rect">
+            <a:avLst/>
+          </a:prstGeom>
+        </p:spPr>
+        <p:txBody>
+          <a:bodyPr vert="horz" lIns="91440" tIns="45720" rIns="91440" bIns="45720" rtlCol="0" anchor="ctr">
+            <a:normAutofit/>
+          </a:bodyPr>
+          <a:lstStyle>
+            <a:lvl1pPr algn="ctr" defTabSz="457200" rtl="0" eaLnBrk="1" latinLnBrk="0" hangingPunct="1">
+              <a:spcBef>
+                <a:spcPct val="0"/>
+              </a:spcBef>
+              <a:buNone/>
+              <a:defRPr sz="4400" kern="1200">
+                <a:solidFill>
+                  <a:schemeClr val="tx1"/>
+                </a:solidFill>
+                <a:latin typeface="+mj-lt"/>
+                <a:ea typeface="+mj-ea"/>
+                <a:cs typeface="+mj-cs"/>
+              </a:defRPr>
+            </a:lvl1pPr>
+          </a:lstStyle>
+          <a:p>
+            <a:pPr algn="r"/>
+            <a:r>
+              <a:rPr lang="en-US" dirty="0" smtClean="0"/>
+              <a:t>Thank you for listening</a:t>
+            </a:r>
+            <a:endParaRPr lang="en-US" dirty="0"/>
+          </a:p>
+        </p:txBody>
+      </p:sp>
       <p:pic>
         <p:nvPicPr>
-          <p:cNvPr id="4" name="Picture 3" descr="eigenvector (white arrows) of tidal field chrisari 2015.png"/>
+          <p:cNvPr id="5" name="Picture 4" descr="Screen Shot 2016-12-12 at 1.51.28 pm.png"/>
           <p:cNvPicPr>
             <a:picLocks noChangeAspect="1"/>
           </p:cNvPicPr>
@@ -4886,24 +5065,54 @@
         </p:blipFill>
         <p:spPr>
           <a:xfrm>
-            <a:off x="0" y="704192"/>
-            <a:ext cx="9144000" cy="4724212"/>
+            <a:off x="3998993" y="2618645"/>
+            <a:ext cx="4973758" cy="3210507"/>
           </a:xfrm>
           <a:prstGeom prst="rect">
             <a:avLst/>
           </a:prstGeom>
         </p:spPr>
       </p:pic>
-      <p:sp>
-        <p:nvSpPr>
-          <p:cNvPr id="5" name="TextBox 4"/>
+      <p:pic>
+        <p:nvPicPr>
+          <p:cNvPr id="4" name="Picture 3" descr="Screen Shot 2016-12-12 at 1.51.16 pm.png"/>
+          <p:cNvPicPr>
+            <a:picLocks noChangeAspect="1"/>
+          </p:cNvPicPr>
+          <p:nvPr/>
+        </p:nvPicPr>
+        <p:blipFill>
+          <a:blip r:embed="rId3">
+            <a:extLst>
+              <a:ext uri="{28A0092B-C50C-407E-A947-70E740481C1C}">
+                <a14:useLocalDpi xmlns:a14="http://schemas.microsoft.com/office/drawing/2010/main" val="0"/>
+              </a:ext>
+            </a:extLst>
+          </a:blip>
+          <a:stretch>
+            <a:fillRect/>
+          </a:stretch>
+        </p:blipFill>
+        <p:spPr>
+          <a:xfrm>
+            <a:off x="242604" y="732730"/>
+            <a:ext cx="4597007" cy="2934384"/>
+          </a:xfrm>
+          <a:prstGeom prst="rect">
+            <a:avLst/>
+          </a:prstGeom>
+        </p:spPr>
+      </p:pic>
+      <p:sp>
+        <p:nvSpPr>
+          <p:cNvPr id="8" name="TextBox 7"/>
           <p:cNvSpPr txBox="1"/>
           <p:nvPr/>
         </p:nvSpPr>
         <p:spPr>
           <a:xfrm>
-            <a:off x="214062" y="5456942"/>
-            <a:ext cx="6376002" cy="369332"/>
+            <a:off x="4839611" y="961032"/>
+            <a:ext cx="2497386" cy="646331"/>
           </a:xfrm>
           <a:prstGeom prst="rect">
             <a:avLst/>
@@ -4911,82 +5120,45 @@
           <a:noFill/>
         </p:spPr>
         <p:txBody>
-          <a:bodyPr wrap="none" rtlCol="0">
+          <a:bodyPr wrap="square" rtlCol="0">
             <a:spAutoFit/>
           </a:bodyPr>
           <a:lstStyle/>
           <a:p>
             <a:r>
               <a:rPr lang="en-US" dirty="0" smtClean="0"/>
-              <a:t>Map of eigenvectors </a:t>
-            </a:r>
-            <a:r>
-              <a:rPr lang="en-US" dirty="0"/>
-              <a:t>(white arrows) of tidal </a:t>
-            </a:r>
-            <a:r>
-              <a:rPr lang="en-US" dirty="0" smtClean="0"/>
-              <a:t>field, </a:t>
-            </a:r>
-            <a:r>
-              <a:rPr lang="en-US" dirty="0" err="1" smtClean="0"/>
-              <a:t>Chisari</a:t>
-            </a:r>
-            <a:r>
-              <a:rPr lang="en-US" dirty="0" smtClean="0"/>
-              <a:t> et al </a:t>
-            </a:r>
-            <a:r>
-              <a:rPr lang="en-US" dirty="0"/>
-              <a:t>2015</a:t>
-            </a:r>
-          </a:p>
-        </p:txBody>
-      </p:sp>
-      <p:sp>
-        <p:nvSpPr>
-          <p:cNvPr id="6" name="Title 1"/>
-          <p:cNvSpPr txBox="1">
-            <a:spLocks/>
-          </p:cNvSpPr>
+              <a:t>Dark matter particles in a Nifty cluster</a:t>
+            </a:r>
+            <a:endParaRPr lang="en-US" dirty="0"/>
+          </a:p>
+        </p:txBody>
+      </p:sp>
+      <p:sp>
+        <p:nvSpPr>
+          <p:cNvPr id="9" name="TextBox 8"/>
+          <p:cNvSpPr txBox="1"/>
           <p:nvPr/>
         </p:nvSpPr>
         <p:spPr>
           <a:xfrm>
-            <a:off x="914400" y="5715000"/>
-            <a:ext cx="8229600" cy="1143000"/>
+            <a:off x="1501607" y="5068669"/>
+            <a:ext cx="2497386" cy="646331"/>
           </a:xfrm>
           <a:prstGeom prst="rect">
             <a:avLst/>
           </a:prstGeom>
+          <a:noFill/>
         </p:spPr>
         <p:txBody>
-          <a:bodyPr vert="horz" lIns="91440" tIns="45720" rIns="91440" bIns="45720" rtlCol="0" anchor="ctr">
-            <a:normAutofit/>
+          <a:bodyPr wrap="square" rtlCol="0">
+            <a:spAutoFit/>
           </a:bodyPr>
-          <a:lstStyle>
-            <a:lvl1pPr algn="ctr" defTabSz="457200" rtl="0" eaLnBrk="1" latinLnBrk="0" hangingPunct="1">
-              <a:spcBef>
-                <a:spcPct val="0"/>
-              </a:spcBef>
-              <a:buNone/>
-              <a:defRPr sz="4400" kern="1200">
-                <a:solidFill>
-                  <a:schemeClr val="tx1"/>
-                </a:solidFill>
-                <a:latin typeface="+mj-lt"/>
-                <a:ea typeface="+mj-ea"/>
-                <a:cs typeface="+mj-cs"/>
-              </a:defRPr>
-            </a:lvl1pPr>
-          </a:lstStyle>
-          <a:p>
-            <a:pPr algn="r"/>
+          <a:lstStyle/>
+          <a:p>
             <a:r>
               <a:rPr lang="en-US" dirty="0" smtClean="0"/>
-              <a:t>Thank you for listening</a:t>
-            </a:r>
-            <a:endParaRPr lang="en-US" dirty="0"/>
+              <a:t>Gas particles tracing the dark matter</a:t>
+            </a:r>
           </a:p>
         </p:txBody>
       </p:sp>

</xml_diff>